<commit_message>
OH schematic cycles update 2
</commit_message>
<xml_diff>
--- a/theory/misc/OH_cycles/schematic_figures/OH_cycles_schematic_v2.pptx
+++ b/theory/misc/OH_cycles/schematic_figures/OH_cycles_schematic_v2.pptx
@@ -14,6 +14,8 @@
     <p:sldId id="262" r:id="rId8"/>
     <p:sldId id="263" r:id="rId9"/>
     <p:sldId id="264" r:id="rId10"/>
+    <p:sldId id="265" r:id="rId11"/>
+    <p:sldId id="266" r:id="rId12"/>
   </p:sldIdLst>
   <p:sldSz cx="12192000" cy="6858000"/>
   <p:notesSz cx="6858000" cy="9144000"/>
@@ -251,7 +253,7 @@
           <a:p>
             <a:fld id="{2A0053D9-6B26-41F6-8E90-D3A684444223}" type="datetimeFigureOut">
               <a:rPr lang="en-US" smtClean="0"/>
-              <a:t>6/11/2018</a:t>
+              <a:t>6/12/2018</a:t>
             </a:fld>
             <a:endParaRPr lang="en-US"/>
           </a:p>
@@ -421,7 +423,7 @@
           <a:p>
             <a:fld id="{2A0053D9-6B26-41F6-8E90-D3A684444223}" type="datetimeFigureOut">
               <a:rPr lang="en-US" smtClean="0"/>
-              <a:t>6/11/2018</a:t>
+              <a:t>6/12/2018</a:t>
             </a:fld>
             <a:endParaRPr lang="en-US"/>
           </a:p>
@@ -601,7 +603,7 @@
           <a:p>
             <a:fld id="{2A0053D9-6B26-41F6-8E90-D3A684444223}" type="datetimeFigureOut">
               <a:rPr lang="en-US" smtClean="0"/>
-              <a:t>6/11/2018</a:t>
+              <a:t>6/12/2018</a:t>
             </a:fld>
             <a:endParaRPr lang="en-US"/>
           </a:p>
@@ -771,7 +773,7 @@
           <a:p>
             <a:fld id="{2A0053D9-6B26-41F6-8E90-D3A684444223}" type="datetimeFigureOut">
               <a:rPr lang="en-US" smtClean="0"/>
-              <a:t>6/11/2018</a:t>
+              <a:t>6/12/2018</a:t>
             </a:fld>
             <a:endParaRPr lang="en-US"/>
           </a:p>
@@ -1017,7 +1019,7 @@
           <a:p>
             <a:fld id="{2A0053D9-6B26-41F6-8E90-D3A684444223}" type="datetimeFigureOut">
               <a:rPr lang="en-US" smtClean="0"/>
-              <a:t>6/11/2018</a:t>
+              <a:t>6/12/2018</a:t>
             </a:fld>
             <a:endParaRPr lang="en-US"/>
           </a:p>
@@ -1249,7 +1251,7 @@
           <a:p>
             <a:fld id="{2A0053D9-6B26-41F6-8E90-D3A684444223}" type="datetimeFigureOut">
               <a:rPr lang="en-US" smtClean="0"/>
-              <a:t>6/11/2018</a:t>
+              <a:t>6/12/2018</a:t>
             </a:fld>
             <a:endParaRPr lang="en-US"/>
           </a:p>
@@ -1616,7 +1618,7 @@
           <a:p>
             <a:fld id="{2A0053D9-6B26-41F6-8E90-D3A684444223}" type="datetimeFigureOut">
               <a:rPr lang="en-US" smtClean="0"/>
-              <a:t>6/11/2018</a:t>
+              <a:t>6/12/2018</a:t>
             </a:fld>
             <a:endParaRPr lang="en-US"/>
           </a:p>
@@ -1734,7 +1736,7 @@
           <a:p>
             <a:fld id="{2A0053D9-6B26-41F6-8E90-D3A684444223}" type="datetimeFigureOut">
               <a:rPr lang="en-US" smtClean="0"/>
-              <a:t>6/11/2018</a:t>
+              <a:t>6/12/2018</a:t>
             </a:fld>
             <a:endParaRPr lang="en-US"/>
           </a:p>
@@ -1829,7 +1831,7 @@
           <a:p>
             <a:fld id="{2A0053D9-6B26-41F6-8E90-D3A684444223}" type="datetimeFigureOut">
               <a:rPr lang="en-US" smtClean="0"/>
-              <a:t>6/11/2018</a:t>
+              <a:t>6/12/2018</a:t>
             </a:fld>
             <a:endParaRPr lang="en-US"/>
           </a:p>
@@ -2106,7 +2108,7 @@
           <a:p>
             <a:fld id="{2A0053D9-6B26-41F6-8E90-D3A684444223}" type="datetimeFigureOut">
               <a:rPr lang="en-US" smtClean="0"/>
-              <a:t>6/11/2018</a:t>
+              <a:t>6/12/2018</a:t>
             </a:fld>
             <a:endParaRPr lang="en-US"/>
           </a:p>
@@ -2359,7 +2361,7 @@
           <a:p>
             <a:fld id="{2A0053D9-6B26-41F6-8E90-D3A684444223}" type="datetimeFigureOut">
               <a:rPr lang="en-US" smtClean="0"/>
-              <a:t>6/11/2018</a:t>
+              <a:t>6/12/2018</a:t>
             </a:fld>
             <a:endParaRPr lang="en-US"/>
           </a:p>
@@ -2572,7 +2574,7 @@
           <a:p>
             <a:fld id="{2A0053D9-6B26-41F6-8E90-D3A684444223}" type="datetimeFigureOut">
               <a:rPr lang="en-US" smtClean="0"/>
-              <a:t>6/11/2018</a:t>
+              <a:t>6/12/2018</a:t>
             </a:fld>
             <a:endParaRPr lang="en-US"/>
           </a:p>
@@ -3970,6 +3972,2547 @@
     <p:extLst>
       <p:ext uri="{BB962C8B-B14F-4D97-AF65-F5344CB8AC3E}">
         <p14:creationId xmlns:p14="http://schemas.microsoft.com/office/powerpoint/2010/main" val="2104519938"/>
+      </p:ext>
+    </p:extLst>
+  </p:cSld>
+  <p:clrMapOvr>
+    <a:masterClrMapping/>
+  </p:clrMapOvr>
+  <p:timing>
+    <p:tnLst>
+      <p:par>
+        <p:cTn id="1" dur="indefinite" restart="never" nodeType="tmRoot"/>
+      </p:par>
+    </p:tnLst>
+  </p:timing>
+</p:sld>
+</file>
+
+<file path=ppt/slides/slide10.xml><?xml version="1.0" encoding="utf-8"?>
+<p:sld xmlns:a="http://schemas.openxmlformats.org/drawingml/2006/main" xmlns:r="http://schemas.openxmlformats.org/officeDocument/2006/relationships" xmlns:p="http://schemas.openxmlformats.org/presentationml/2006/main">
+  <p:cSld>
+    <p:spTree>
+      <p:nvGrpSpPr>
+        <p:cNvPr id="1" name=""/>
+        <p:cNvGrpSpPr/>
+        <p:nvPr/>
+      </p:nvGrpSpPr>
+      <p:grpSpPr>
+        <a:xfrm>
+          <a:off x="0" y="0"/>
+          <a:ext cx="0" cy="0"/>
+          <a:chOff x="0" y="0"/>
+          <a:chExt cx="0" cy="0"/>
+        </a:xfrm>
+      </p:grpSpPr>
+      <p:sp>
+        <p:nvSpPr>
+          <p:cNvPr id="14" name="Arc 13"/>
+          <p:cNvSpPr/>
+          <p:nvPr/>
+        </p:nvSpPr>
+        <p:spPr>
+          <a:xfrm>
+            <a:off x="4230997" y="727370"/>
+            <a:ext cx="914400" cy="914400"/>
+          </a:xfrm>
+          <a:prstGeom prst="arc">
+            <a:avLst>
+              <a:gd name="adj1" fmla="val 21275520"/>
+              <a:gd name="adj2" fmla="val 3817827"/>
+            </a:avLst>
+          </a:prstGeom>
+          <a:noFill/>
+          <a:ln w="38100">
+            <a:solidFill>
+              <a:schemeClr val="tx1"/>
+            </a:solidFill>
+            <a:headEnd type="triangle" w="med" len="med"/>
+            <a:tailEnd type="none" w="med" len="med"/>
+          </a:ln>
+        </p:spPr>
+        <p:style>
+          <a:lnRef idx="1">
+            <a:schemeClr val="accent1"/>
+          </a:lnRef>
+          <a:fillRef idx="0">
+            <a:schemeClr val="accent1"/>
+          </a:fillRef>
+          <a:effectRef idx="0">
+            <a:schemeClr val="accent1"/>
+          </a:effectRef>
+          <a:fontRef idx="minor">
+            <a:schemeClr val="tx1"/>
+          </a:fontRef>
+        </p:style>
+        <p:txBody>
+          <a:bodyPr rtlCol="0" anchor="ctr"/>
+          <a:lstStyle/>
+          <a:p>
+            <a:pPr algn="ctr"/>
+            <a:endParaRPr lang="en-US"/>
+          </a:p>
+        </p:txBody>
+      </p:sp>
+      <p:grpSp>
+        <p:nvGrpSpPr>
+          <p:cNvPr id="10" name="Group 9"/>
+          <p:cNvGrpSpPr/>
+          <p:nvPr/>
+        </p:nvGrpSpPr>
+        <p:grpSpPr>
+          <a:xfrm>
+            <a:off x="1765485" y="-2591062"/>
+            <a:ext cx="6550455" cy="8303661"/>
+            <a:chOff x="1765485" y="-3154942"/>
+            <a:chExt cx="6550455" cy="8303661"/>
+          </a:xfrm>
+        </p:grpSpPr>
+        <p:grpSp>
+          <p:nvGrpSpPr>
+            <p:cNvPr id="3" name="Group 2"/>
+            <p:cNvGrpSpPr>
+              <a:grpSpLocks noChangeAspect="1"/>
+            </p:cNvGrpSpPr>
+            <p:nvPr/>
+          </p:nvGrpSpPr>
+          <p:grpSpPr>
+            <a:xfrm>
+              <a:off x="1765485" y="-3154942"/>
+              <a:ext cx="6409304" cy="8137528"/>
+              <a:chOff x="208933" y="-5534900"/>
+              <a:chExt cx="9593435" cy="12180235"/>
+            </a:xfrm>
+          </p:grpSpPr>
+          <p:sp>
+            <p:nvSpPr>
+              <p:cNvPr id="21" name="Arc 20"/>
+              <p:cNvSpPr>
+                <a:spLocks noChangeAspect="1"/>
+              </p:cNvSpPr>
+              <p:nvPr/>
+            </p:nvSpPr>
+            <p:spPr>
+              <a:xfrm>
+                <a:off x="3399759" y="241864"/>
+                <a:ext cx="6400800" cy="6400800"/>
+              </a:xfrm>
+              <a:prstGeom prst="arc">
+                <a:avLst>
+                  <a:gd name="adj1" fmla="val 16805050"/>
+                  <a:gd name="adj2" fmla="val 20103395"/>
+                </a:avLst>
+              </a:prstGeom>
+              <a:noFill/>
+              <a:ln w="76200">
+                <a:solidFill>
+                  <a:srgbClr val="FF0000"/>
+                </a:solidFill>
+                <a:headEnd type="none" w="med" len="med"/>
+                <a:tailEnd type="triangle" w="med" len="med"/>
+              </a:ln>
+            </p:spPr>
+            <p:style>
+              <a:lnRef idx="1">
+                <a:schemeClr val="accent1"/>
+              </a:lnRef>
+              <a:fillRef idx="0">
+                <a:schemeClr val="accent1"/>
+              </a:fillRef>
+              <a:effectRef idx="0">
+                <a:schemeClr val="accent1"/>
+              </a:effectRef>
+              <a:fontRef idx="minor">
+                <a:schemeClr val="tx1"/>
+              </a:fontRef>
+            </p:style>
+            <p:txBody>
+              <a:bodyPr rtlCol="0" anchor="ctr"/>
+              <a:lstStyle/>
+              <a:p>
+                <a:pPr algn="ctr"/>
+                <a:endParaRPr lang="en-US"/>
+              </a:p>
+            </p:txBody>
+          </p:sp>
+          <p:sp>
+            <p:nvSpPr>
+              <p:cNvPr id="23" name="Arc 22"/>
+              <p:cNvSpPr>
+                <a:spLocks noChangeAspect="1"/>
+              </p:cNvSpPr>
+              <p:nvPr/>
+            </p:nvSpPr>
+            <p:spPr>
+              <a:xfrm>
+                <a:off x="3401568" y="244535"/>
+                <a:ext cx="6400800" cy="6400800"/>
+              </a:xfrm>
+              <a:prstGeom prst="arc">
+                <a:avLst>
+                  <a:gd name="adj1" fmla="val 20636489"/>
+                  <a:gd name="adj2" fmla="val 1261109"/>
+                </a:avLst>
+              </a:prstGeom>
+              <a:noFill/>
+              <a:ln w="76200">
+                <a:solidFill>
+                  <a:schemeClr val="tx1"/>
+                </a:solidFill>
+                <a:headEnd type="triangle" w="med" len="med"/>
+                <a:tailEnd type="triangle" w="med" len="med"/>
+              </a:ln>
+            </p:spPr>
+            <p:style>
+              <a:lnRef idx="1">
+                <a:schemeClr val="accent1"/>
+              </a:lnRef>
+              <a:fillRef idx="0">
+                <a:schemeClr val="accent1"/>
+              </a:fillRef>
+              <a:effectRef idx="0">
+                <a:schemeClr val="accent1"/>
+              </a:effectRef>
+              <a:fontRef idx="minor">
+                <a:schemeClr val="tx1"/>
+              </a:fontRef>
+            </p:style>
+            <p:txBody>
+              <a:bodyPr rtlCol="0" anchor="ctr"/>
+              <a:lstStyle/>
+              <a:p>
+                <a:pPr algn="ctr"/>
+                <a:endParaRPr lang="en-US"/>
+              </a:p>
+            </p:txBody>
+          </p:sp>
+          <p:sp>
+            <p:nvSpPr>
+              <p:cNvPr id="24" name="Arc 23"/>
+              <p:cNvSpPr>
+                <a:spLocks noChangeAspect="1"/>
+              </p:cNvSpPr>
+              <p:nvPr/>
+            </p:nvSpPr>
+            <p:spPr>
+              <a:xfrm>
+                <a:off x="3401568" y="244535"/>
+                <a:ext cx="6400800" cy="6400800"/>
+              </a:xfrm>
+              <a:prstGeom prst="arc">
+                <a:avLst>
+                  <a:gd name="adj1" fmla="val 1983782"/>
+                  <a:gd name="adj2" fmla="val 4630424"/>
+                </a:avLst>
+              </a:prstGeom>
+              <a:noFill/>
+              <a:ln w="76200">
+                <a:solidFill>
+                  <a:schemeClr val="tx1"/>
+                </a:solidFill>
+                <a:headEnd type="triangle" w="med" len="med"/>
+                <a:tailEnd type="triangle" w="med" len="med"/>
+              </a:ln>
+            </p:spPr>
+            <p:style>
+              <a:lnRef idx="1">
+                <a:schemeClr val="accent1"/>
+              </a:lnRef>
+              <a:fillRef idx="0">
+                <a:schemeClr val="accent1"/>
+              </a:fillRef>
+              <a:effectRef idx="0">
+                <a:schemeClr val="accent1"/>
+              </a:effectRef>
+              <a:fontRef idx="minor">
+                <a:schemeClr val="tx1"/>
+              </a:fontRef>
+            </p:style>
+            <p:txBody>
+              <a:bodyPr rtlCol="0" anchor="ctr"/>
+              <a:lstStyle/>
+              <a:p>
+                <a:pPr algn="ctr"/>
+                <a:endParaRPr lang="en-US"/>
+              </a:p>
+            </p:txBody>
+          </p:sp>
+          <p:sp>
+            <p:nvSpPr>
+              <p:cNvPr id="25" name="Arc 24"/>
+              <p:cNvSpPr>
+                <a:spLocks noChangeAspect="1"/>
+              </p:cNvSpPr>
+              <p:nvPr/>
+            </p:nvSpPr>
+            <p:spPr>
+              <a:xfrm>
+                <a:off x="3401568" y="244535"/>
+                <a:ext cx="6400800" cy="6400800"/>
+              </a:xfrm>
+              <a:prstGeom prst="arc">
+                <a:avLst>
+                  <a:gd name="adj1" fmla="val 6359187"/>
+                  <a:gd name="adj2" fmla="val 7532913"/>
+                </a:avLst>
+              </a:prstGeom>
+              <a:noFill/>
+              <a:ln w="76200">
+                <a:solidFill>
+                  <a:schemeClr val="tx1"/>
+                </a:solidFill>
+                <a:headEnd type="triangle" w="med" len="med"/>
+                <a:tailEnd type="triangle" w="med" len="med"/>
+              </a:ln>
+            </p:spPr>
+            <p:style>
+              <a:lnRef idx="1">
+                <a:schemeClr val="accent1"/>
+              </a:lnRef>
+              <a:fillRef idx="0">
+                <a:schemeClr val="accent1"/>
+              </a:fillRef>
+              <a:effectRef idx="0">
+                <a:schemeClr val="accent1"/>
+              </a:effectRef>
+              <a:fontRef idx="minor">
+                <a:schemeClr val="tx1"/>
+              </a:fontRef>
+            </p:style>
+            <p:txBody>
+              <a:bodyPr rtlCol="0" anchor="ctr"/>
+              <a:lstStyle/>
+              <a:p>
+                <a:pPr algn="ctr"/>
+                <a:endParaRPr lang="en-US"/>
+              </a:p>
+            </p:txBody>
+          </p:sp>
+          <p:sp>
+            <p:nvSpPr>
+              <p:cNvPr id="34" name="Arc 33"/>
+              <p:cNvSpPr>
+                <a:spLocks noChangeAspect="1"/>
+              </p:cNvSpPr>
+              <p:nvPr/>
+            </p:nvSpPr>
+            <p:spPr>
+              <a:xfrm>
+                <a:off x="3401568" y="244535"/>
+                <a:ext cx="6400800" cy="6400800"/>
+              </a:xfrm>
+              <a:prstGeom prst="arc">
+                <a:avLst>
+                  <a:gd name="adj1" fmla="val 12010974"/>
+                  <a:gd name="adj2" fmla="val 12976064"/>
+                </a:avLst>
+              </a:prstGeom>
+              <a:noFill/>
+              <a:ln w="76200">
+                <a:solidFill>
+                  <a:schemeClr val="tx1"/>
+                </a:solidFill>
+                <a:headEnd type="none" w="med" len="med"/>
+                <a:tailEnd type="triangle" w="med" len="med"/>
+              </a:ln>
+            </p:spPr>
+            <p:style>
+              <a:lnRef idx="1">
+                <a:schemeClr val="accent1"/>
+              </a:lnRef>
+              <a:fillRef idx="0">
+                <a:schemeClr val="accent1"/>
+              </a:fillRef>
+              <a:effectRef idx="0">
+                <a:schemeClr val="accent1"/>
+              </a:effectRef>
+              <a:fontRef idx="minor">
+                <a:schemeClr val="tx1"/>
+              </a:fontRef>
+            </p:style>
+            <p:txBody>
+              <a:bodyPr rtlCol="0" anchor="ctr"/>
+              <a:lstStyle/>
+              <a:p>
+                <a:pPr algn="ctr"/>
+                <a:endParaRPr lang="en-US"/>
+              </a:p>
+            </p:txBody>
+          </p:sp>
+          <p:sp>
+            <p:nvSpPr>
+              <p:cNvPr id="2" name="Arc 1"/>
+              <p:cNvSpPr>
+                <a:spLocks noChangeAspect="1"/>
+              </p:cNvSpPr>
+              <p:nvPr/>
+            </p:nvSpPr>
+            <p:spPr>
+              <a:xfrm>
+                <a:off x="1423428" y="-2010839"/>
+                <a:ext cx="5487496" cy="7406640"/>
+              </a:xfrm>
+              <a:prstGeom prst="arc">
+                <a:avLst>
+                  <a:gd name="adj1" fmla="val 20228158"/>
+                  <a:gd name="adj2" fmla="val 5480223"/>
+                </a:avLst>
+              </a:prstGeom>
+              <a:noFill/>
+              <a:ln w="76200">
+                <a:solidFill>
+                  <a:schemeClr val="accent1"/>
+                </a:solidFill>
+                <a:headEnd type="triangle" w="med" len="med"/>
+                <a:tailEnd type="none" w="med" len="med"/>
+              </a:ln>
+            </p:spPr>
+            <p:style>
+              <a:lnRef idx="1">
+                <a:schemeClr val="accent1"/>
+              </a:lnRef>
+              <a:fillRef idx="0">
+                <a:schemeClr val="accent1"/>
+              </a:fillRef>
+              <a:effectRef idx="0">
+                <a:schemeClr val="accent1"/>
+              </a:effectRef>
+              <a:fontRef idx="minor">
+                <a:schemeClr val="tx1"/>
+              </a:fontRef>
+            </p:style>
+            <p:txBody>
+              <a:bodyPr rtlCol="0" anchor="ctr"/>
+              <a:lstStyle/>
+              <a:p>
+                <a:pPr algn="ctr"/>
+                <a:endParaRPr lang="en-US"/>
+              </a:p>
+            </p:txBody>
+          </p:sp>
+          <p:sp>
+            <p:nvSpPr>
+              <p:cNvPr id="20" name="Arc 19"/>
+              <p:cNvSpPr>
+                <a:spLocks noChangeAspect="1"/>
+              </p:cNvSpPr>
+              <p:nvPr/>
+            </p:nvSpPr>
+            <p:spPr>
+              <a:xfrm>
+                <a:off x="208933" y="-5534900"/>
+                <a:ext cx="6390494" cy="9144000"/>
+              </a:xfrm>
+              <a:prstGeom prst="arc">
+                <a:avLst>
+                  <a:gd name="adj1" fmla="val 1630765"/>
+                  <a:gd name="adj2" fmla="val 5406928"/>
+                </a:avLst>
+              </a:prstGeom>
+              <a:noFill/>
+              <a:ln w="76200">
+                <a:solidFill>
+                  <a:schemeClr val="accent1"/>
+                </a:solidFill>
+                <a:headEnd type="triangle" w="med" len="med"/>
+                <a:tailEnd type="none" w="med" len="med"/>
+              </a:ln>
+            </p:spPr>
+            <p:style>
+              <a:lnRef idx="1">
+                <a:schemeClr val="accent1"/>
+              </a:lnRef>
+              <a:fillRef idx="0">
+                <a:schemeClr val="accent1"/>
+              </a:fillRef>
+              <a:effectRef idx="0">
+                <a:schemeClr val="accent1"/>
+              </a:effectRef>
+              <a:fontRef idx="minor">
+                <a:schemeClr val="tx1"/>
+              </a:fontRef>
+            </p:style>
+            <p:txBody>
+              <a:bodyPr rtlCol="0" anchor="ctr"/>
+              <a:lstStyle/>
+              <a:p>
+                <a:pPr algn="ctr"/>
+                <a:endParaRPr lang="en-US"/>
+              </a:p>
+            </p:txBody>
+          </p:sp>
+          <p:sp>
+            <p:nvSpPr>
+              <p:cNvPr id="32" name="Arc 31"/>
+              <p:cNvSpPr>
+                <a:spLocks noChangeAspect="1"/>
+              </p:cNvSpPr>
+              <p:nvPr/>
+            </p:nvSpPr>
+            <p:spPr>
+              <a:xfrm>
+                <a:off x="3401568" y="244535"/>
+                <a:ext cx="6400800" cy="6400800"/>
+              </a:xfrm>
+              <a:prstGeom prst="arc">
+                <a:avLst>
+                  <a:gd name="adj1" fmla="val 10542843"/>
+                  <a:gd name="adj2" fmla="val 11340972"/>
+                </a:avLst>
+              </a:prstGeom>
+              <a:noFill/>
+              <a:ln w="76200">
+                <a:solidFill>
+                  <a:schemeClr val="tx1"/>
+                </a:solidFill>
+                <a:headEnd type="none" w="med" len="med"/>
+                <a:tailEnd type="triangle" w="med" len="med"/>
+              </a:ln>
+            </p:spPr>
+            <p:style>
+              <a:lnRef idx="1">
+                <a:schemeClr val="accent1"/>
+              </a:lnRef>
+              <a:fillRef idx="0">
+                <a:schemeClr val="accent1"/>
+              </a:fillRef>
+              <a:effectRef idx="0">
+                <a:schemeClr val="accent1"/>
+              </a:effectRef>
+              <a:fontRef idx="minor">
+                <a:schemeClr val="tx1"/>
+              </a:fontRef>
+            </p:style>
+            <p:txBody>
+              <a:bodyPr rtlCol="0" anchor="ctr"/>
+              <a:lstStyle/>
+              <a:p>
+                <a:pPr algn="ctr"/>
+                <a:endParaRPr lang="en-US"/>
+              </a:p>
+            </p:txBody>
+          </p:sp>
+          <p:sp>
+            <p:nvSpPr>
+              <p:cNvPr id="29" name="Arc 28"/>
+              <p:cNvSpPr>
+                <a:spLocks noChangeAspect="1"/>
+              </p:cNvSpPr>
+              <p:nvPr/>
+            </p:nvSpPr>
+            <p:spPr>
+              <a:xfrm>
+                <a:off x="3401568" y="244535"/>
+                <a:ext cx="6400800" cy="6400800"/>
+              </a:xfrm>
+              <a:prstGeom prst="arc">
+                <a:avLst>
+                  <a:gd name="adj1" fmla="val 8456322"/>
+                  <a:gd name="adj2" fmla="val 9844837"/>
+                </a:avLst>
+              </a:prstGeom>
+              <a:noFill/>
+              <a:ln w="76200">
+                <a:solidFill>
+                  <a:schemeClr val="tx1"/>
+                </a:solidFill>
+                <a:headEnd type="none" w="med" len="med"/>
+                <a:tailEnd type="triangle" w="med" len="med"/>
+              </a:ln>
+            </p:spPr>
+            <p:style>
+              <a:lnRef idx="1">
+                <a:schemeClr val="accent1"/>
+              </a:lnRef>
+              <a:fillRef idx="0">
+                <a:schemeClr val="accent1"/>
+              </a:fillRef>
+              <a:effectRef idx="0">
+                <a:schemeClr val="accent1"/>
+              </a:effectRef>
+              <a:fontRef idx="minor">
+                <a:schemeClr val="tx1"/>
+              </a:fontRef>
+            </p:style>
+            <p:txBody>
+              <a:bodyPr rtlCol="0" anchor="ctr"/>
+              <a:lstStyle/>
+              <a:p>
+                <a:pPr algn="ctr"/>
+                <a:endParaRPr lang="en-US"/>
+              </a:p>
+            </p:txBody>
+          </p:sp>
+          <p:sp>
+            <p:nvSpPr>
+              <p:cNvPr id="37" name="Arc 36"/>
+              <p:cNvSpPr>
+                <a:spLocks noChangeAspect="1"/>
+              </p:cNvSpPr>
+              <p:nvPr/>
+            </p:nvSpPr>
+            <p:spPr>
+              <a:xfrm>
+                <a:off x="3401568" y="244535"/>
+                <a:ext cx="6400800" cy="6400800"/>
+              </a:xfrm>
+              <a:prstGeom prst="arc">
+                <a:avLst>
+                  <a:gd name="adj1" fmla="val 13952431"/>
+                  <a:gd name="adj2" fmla="val 15720091"/>
+                </a:avLst>
+              </a:prstGeom>
+              <a:noFill/>
+              <a:ln w="76200">
+                <a:solidFill>
+                  <a:schemeClr val="accent1"/>
+                </a:solidFill>
+                <a:headEnd type="none" w="med" len="med"/>
+                <a:tailEnd type="triangle" w="med" len="med"/>
+              </a:ln>
+            </p:spPr>
+            <p:style>
+              <a:lnRef idx="1">
+                <a:schemeClr val="accent1"/>
+              </a:lnRef>
+              <a:fillRef idx="0">
+                <a:schemeClr val="accent1"/>
+              </a:fillRef>
+              <a:effectRef idx="0">
+                <a:schemeClr val="accent1"/>
+              </a:effectRef>
+              <a:fontRef idx="minor">
+                <a:schemeClr val="tx1"/>
+              </a:fontRef>
+            </p:style>
+            <p:txBody>
+              <a:bodyPr rtlCol="0" anchor="ctr"/>
+              <a:lstStyle/>
+              <a:p>
+                <a:pPr algn="ctr"/>
+                <a:endParaRPr lang="en-US"/>
+              </a:p>
+            </p:txBody>
+          </p:sp>
+        </p:grpSp>
+        <p:sp>
+          <p:nvSpPr>
+            <p:cNvPr id="4" name="TextBox 3"/>
+            <p:cNvSpPr txBox="1"/>
+            <p:nvPr/>
+          </p:nvSpPr>
+          <p:spPr>
+            <a:xfrm>
+              <a:off x="5801504" y="544490"/>
+              <a:ext cx="486030" cy="369332"/>
+            </a:xfrm>
+            <a:prstGeom prst="rect">
+              <a:avLst/>
+            </a:prstGeom>
+            <a:noFill/>
+          </p:spPr>
+          <p:txBody>
+            <a:bodyPr wrap="none" rtlCol="0">
+              <a:spAutoFit/>
+            </a:bodyPr>
+            <a:lstStyle/>
+            <a:p>
+              <a:r>
+                <a:rPr lang="en-US" b="1" dirty="0" smtClean="0"/>
+                <a:t>OH</a:t>
+              </a:r>
+              <a:endParaRPr lang="en-US" b="1" dirty="0"/>
+            </a:p>
+          </p:txBody>
+        </p:sp>
+        <p:sp>
+          <p:nvSpPr>
+            <p:cNvPr id="22" name="TextBox 21"/>
+            <p:cNvSpPr txBox="1"/>
+            <p:nvPr/>
+          </p:nvSpPr>
+          <p:spPr>
+            <a:xfrm>
+              <a:off x="7874602" y="1913515"/>
+              <a:ext cx="437940" cy="369332"/>
+            </a:xfrm>
+            <a:prstGeom prst="rect">
+              <a:avLst/>
+            </a:prstGeom>
+            <a:noFill/>
+          </p:spPr>
+          <p:txBody>
+            <a:bodyPr wrap="none" rtlCol="0">
+              <a:spAutoFit/>
+            </a:bodyPr>
+            <a:lstStyle/>
+            <a:p>
+              <a:r>
+                <a:rPr lang="en-US" b="1" dirty="0" err="1" smtClean="0"/>
+                <a:t>nR</a:t>
+              </a:r>
+              <a:endParaRPr lang="en-US" b="1" dirty="0"/>
+            </a:p>
+          </p:txBody>
+        </p:sp>
+        <p:sp>
+          <p:nvSpPr>
+            <p:cNvPr id="26" name="TextBox 25"/>
+            <p:cNvSpPr txBox="1"/>
+            <p:nvPr/>
+          </p:nvSpPr>
+          <p:spPr>
+            <a:xfrm>
+              <a:off x="7646205" y="3635123"/>
+              <a:ext cx="669735" cy="369332"/>
+            </a:xfrm>
+            <a:prstGeom prst="rect">
+              <a:avLst/>
+            </a:prstGeom>
+            <a:noFill/>
+          </p:spPr>
+          <p:txBody>
+            <a:bodyPr wrap="none" rtlCol="0">
+              <a:spAutoFit/>
+            </a:bodyPr>
+            <a:lstStyle/>
+            <a:p>
+              <a:r>
+                <a:rPr lang="en-US" b="1" dirty="0" smtClean="0"/>
+                <a:t>nRO</a:t>
+              </a:r>
+              <a:r>
+                <a:rPr lang="en-US" b="1" baseline="-25000" dirty="0" smtClean="0"/>
+                <a:t>2</a:t>
+              </a:r>
+              <a:endParaRPr lang="en-US" b="1" baseline="-25000" dirty="0"/>
+            </a:p>
+          </p:txBody>
+        </p:sp>
+        <p:sp>
+          <p:nvSpPr>
+            <p:cNvPr id="5" name="TextBox 4"/>
+            <p:cNvSpPr txBox="1"/>
+            <p:nvPr/>
+          </p:nvSpPr>
+          <p:spPr>
+            <a:xfrm>
+              <a:off x="5550346" y="4779387"/>
+              <a:ext cx="867545" cy="369332"/>
+            </a:xfrm>
+            <a:prstGeom prst="rect">
+              <a:avLst/>
+            </a:prstGeom>
+            <a:noFill/>
+          </p:spPr>
+          <p:txBody>
+            <a:bodyPr wrap="none" rtlCol="0">
+              <a:spAutoFit/>
+            </a:bodyPr>
+            <a:lstStyle/>
+            <a:p>
+              <a:r>
+                <a:rPr lang="en-US" dirty="0" smtClean="0">
+                  <a:ln>
+                    <a:solidFill>
+                      <a:schemeClr val="tx1"/>
+                    </a:solidFill>
+                  </a:ln>
+                </a:rPr>
+                <a:t>QOOH</a:t>
+              </a:r>
+              <a:r>
+                <a:rPr lang="en-US" baseline="-25000" dirty="0" smtClean="0">
+                  <a:ln>
+                    <a:solidFill>
+                      <a:schemeClr val="tx1"/>
+                    </a:solidFill>
+                  </a:ln>
+                </a:rPr>
+                <a:t>1</a:t>
+              </a:r>
+              <a:endParaRPr lang="en-US" baseline="-25000" dirty="0">
+                <a:ln>
+                  <a:solidFill>
+                    <a:schemeClr val="tx1"/>
+                  </a:solidFill>
+                </a:ln>
+              </a:endParaRPr>
+            </a:p>
+          </p:txBody>
+        </p:sp>
+        <p:sp>
+          <p:nvSpPr>
+            <p:cNvPr id="6" name="TextBox 5"/>
+            <p:cNvSpPr txBox="1"/>
+            <p:nvPr/>
+          </p:nvSpPr>
+          <p:spPr>
+            <a:xfrm>
+              <a:off x="3992633" y="4176073"/>
+              <a:ext cx="1098378" cy="369332"/>
+            </a:xfrm>
+            <a:prstGeom prst="rect">
+              <a:avLst/>
+            </a:prstGeom>
+            <a:noFill/>
+          </p:spPr>
+          <p:txBody>
+            <a:bodyPr wrap="none" rtlCol="0">
+              <a:spAutoFit/>
+            </a:bodyPr>
+            <a:lstStyle/>
+            <a:p>
+              <a:r>
+                <a:rPr lang="en-US" dirty="0" smtClean="0">
+                  <a:ln>
+                    <a:solidFill>
+                      <a:schemeClr val="tx1"/>
+                    </a:solidFill>
+                  </a:ln>
+                </a:rPr>
+                <a:t>O</a:t>
+              </a:r>
+              <a:r>
+                <a:rPr lang="en-US" baseline="-25000" dirty="0" smtClean="0">
+                  <a:ln>
+                    <a:solidFill>
+                      <a:schemeClr val="tx1"/>
+                    </a:solidFill>
+                  </a:ln>
+                </a:rPr>
+                <a:t>2</a:t>
+              </a:r>
+              <a:r>
+                <a:rPr lang="en-US" dirty="0" smtClean="0">
+                  <a:ln>
+                    <a:solidFill>
+                      <a:schemeClr val="tx1"/>
+                    </a:solidFill>
+                  </a:ln>
+                </a:rPr>
+                <a:t>QOOH</a:t>
+              </a:r>
+              <a:r>
+                <a:rPr lang="en-US" baseline="-25000" dirty="0" smtClean="0">
+                  <a:ln>
+                    <a:solidFill>
+                      <a:schemeClr val="tx1"/>
+                    </a:solidFill>
+                  </a:ln>
+                </a:rPr>
+                <a:t>1</a:t>
+              </a:r>
+              <a:endParaRPr lang="en-US" baseline="-25000" dirty="0">
+                <a:ln>
+                  <a:solidFill>
+                    <a:schemeClr val="tx1"/>
+                  </a:solidFill>
+                </a:ln>
+              </a:endParaRPr>
+            </a:p>
+          </p:txBody>
+        </p:sp>
+        <p:sp>
+          <p:nvSpPr>
+            <p:cNvPr id="7" name="TextBox 6"/>
+            <p:cNvSpPr txBox="1"/>
+            <p:nvPr/>
+          </p:nvSpPr>
+          <p:spPr>
+            <a:xfrm>
+              <a:off x="3394187" y="3063712"/>
+              <a:ext cx="1069780" cy="369332"/>
+            </a:xfrm>
+            <a:prstGeom prst="rect">
+              <a:avLst/>
+            </a:prstGeom>
+            <a:noFill/>
+          </p:spPr>
+          <p:txBody>
+            <a:bodyPr wrap="none" rtlCol="0">
+              <a:spAutoFit/>
+            </a:bodyPr>
+            <a:lstStyle/>
+            <a:p>
+              <a:r>
+                <a:rPr lang="en-US" dirty="0" smtClean="0">
+                  <a:ln>
+                    <a:solidFill>
+                      <a:schemeClr val="tx1"/>
+                    </a:solidFill>
+                  </a:ln>
+                </a:rPr>
+                <a:t>OQ’OOH</a:t>
+              </a:r>
+              <a:r>
+                <a:rPr lang="en-US" baseline="-25000" dirty="0" smtClean="0">
+                  <a:ln>
+                    <a:solidFill>
+                      <a:schemeClr val="tx1"/>
+                    </a:solidFill>
+                  </a:ln>
+                </a:rPr>
+                <a:t>1</a:t>
+              </a:r>
+              <a:endParaRPr lang="en-US" baseline="-25000" dirty="0">
+                <a:ln>
+                  <a:solidFill>
+                    <a:schemeClr val="tx1"/>
+                  </a:solidFill>
+                </a:ln>
+              </a:endParaRPr>
+            </a:p>
+          </p:txBody>
+        </p:sp>
+        <p:sp>
+          <p:nvSpPr>
+            <p:cNvPr id="8" name="TextBox 7"/>
+            <p:cNvSpPr txBox="1"/>
+            <p:nvPr/>
+          </p:nvSpPr>
+          <p:spPr>
+            <a:xfrm>
+              <a:off x="3570747" y="2126461"/>
+              <a:ext cx="773225" cy="369332"/>
+            </a:xfrm>
+            <a:prstGeom prst="rect">
+              <a:avLst/>
+            </a:prstGeom>
+            <a:noFill/>
+          </p:spPr>
+          <p:txBody>
+            <a:bodyPr wrap="none" rtlCol="0">
+              <a:spAutoFit/>
+            </a:bodyPr>
+            <a:lstStyle/>
+            <a:p>
+              <a:r>
+                <a:rPr lang="en-US" dirty="0" smtClean="0">
+                  <a:ln>
+                    <a:solidFill>
+                      <a:schemeClr val="tx1"/>
+                    </a:solidFill>
+                  </a:ln>
+                </a:rPr>
+                <a:t>OQ’O</a:t>
+              </a:r>
+              <a:r>
+                <a:rPr lang="en-US" baseline="-25000" dirty="0" smtClean="0">
+                  <a:ln>
+                    <a:solidFill>
+                      <a:schemeClr val="tx1"/>
+                    </a:solidFill>
+                  </a:ln>
+                </a:rPr>
+                <a:t>1</a:t>
+              </a:r>
+              <a:endParaRPr lang="en-US" baseline="-25000" dirty="0">
+                <a:ln>
+                  <a:solidFill>
+                    <a:schemeClr val="tx1"/>
+                  </a:solidFill>
+                </a:ln>
+              </a:endParaRPr>
+            </a:p>
+          </p:txBody>
+        </p:sp>
+        <p:sp>
+          <p:nvSpPr>
+            <p:cNvPr id="9" name="TextBox 8"/>
+            <p:cNvSpPr txBox="1"/>
+            <p:nvPr/>
+          </p:nvSpPr>
+          <p:spPr>
+            <a:xfrm>
+              <a:off x="4019236" y="1159496"/>
+              <a:ext cx="950901" cy="369332"/>
+            </a:xfrm>
+            <a:prstGeom prst="rect">
+              <a:avLst/>
+            </a:prstGeom>
+            <a:noFill/>
+          </p:spPr>
+          <p:txBody>
+            <a:bodyPr wrap="none" rtlCol="0">
+              <a:spAutoFit/>
+            </a:bodyPr>
+            <a:lstStyle/>
+            <a:p>
+              <a:r>
+                <a:rPr lang="en-US" dirty="0" smtClean="0">
+                  <a:ln>
+                    <a:solidFill>
+                      <a:schemeClr val="tx1"/>
+                    </a:solidFill>
+                  </a:ln>
+                </a:rPr>
+                <a:t>CH</a:t>
+              </a:r>
+              <a:r>
+                <a:rPr lang="en-US" baseline="-25000" dirty="0" smtClean="0">
+                  <a:ln>
+                    <a:solidFill>
+                      <a:schemeClr val="tx1"/>
+                    </a:solidFill>
+                  </a:ln>
+                </a:rPr>
+                <a:t>2</a:t>
+              </a:r>
+              <a:r>
+                <a:rPr lang="en-US" dirty="0" smtClean="0">
+                  <a:ln>
+                    <a:solidFill>
+                      <a:schemeClr val="tx1"/>
+                    </a:solidFill>
+                  </a:ln>
+                </a:rPr>
+                <a:t>CHO</a:t>
+              </a:r>
+              <a:endParaRPr lang="en-US" baseline="-25000" dirty="0">
+                <a:ln>
+                  <a:solidFill>
+                    <a:schemeClr val="tx1"/>
+                  </a:solidFill>
+                </a:ln>
+              </a:endParaRPr>
+            </a:p>
+          </p:txBody>
+        </p:sp>
+      </p:grpSp>
+      <p:sp>
+        <p:nvSpPr>
+          <p:cNvPr id="11" name="TextBox 10"/>
+          <p:cNvSpPr txBox="1"/>
+          <p:nvPr/>
+        </p:nvSpPr>
+        <p:spPr>
+          <a:xfrm>
+            <a:off x="8268582" y="3298289"/>
+            <a:ext cx="530915" cy="369332"/>
+          </a:xfrm>
+          <a:prstGeom prst="rect">
+            <a:avLst/>
+          </a:prstGeom>
+          <a:noFill/>
+        </p:spPr>
+        <p:txBody>
+          <a:bodyPr wrap="none" rtlCol="0">
+            <a:spAutoFit/>
+          </a:bodyPr>
+          <a:lstStyle/>
+          <a:p>
+            <a:r>
+              <a:rPr lang="en-US" dirty="0" smtClean="0"/>
+              <a:t>+O</a:t>
+            </a:r>
+            <a:r>
+              <a:rPr lang="en-US" baseline="-25000" dirty="0" smtClean="0"/>
+              <a:t>2</a:t>
+            </a:r>
+            <a:endParaRPr lang="en-US" baseline="-25000" dirty="0"/>
+          </a:p>
+        </p:txBody>
+      </p:sp>
+      <p:sp>
+        <p:nvSpPr>
+          <p:cNvPr id="27" name="TextBox 26"/>
+          <p:cNvSpPr txBox="1"/>
+          <p:nvPr/>
+        </p:nvSpPr>
+        <p:spPr>
+          <a:xfrm>
+            <a:off x="4642286" y="5346369"/>
+            <a:ext cx="530915" cy="369332"/>
+          </a:xfrm>
+          <a:prstGeom prst="rect">
+            <a:avLst/>
+          </a:prstGeom>
+          <a:noFill/>
+        </p:spPr>
+        <p:txBody>
+          <a:bodyPr wrap="none" rtlCol="0">
+            <a:spAutoFit/>
+          </a:bodyPr>
+          <a:lstStyle/>
+          <a:p>
+            <a:r>
+              <a:rPr lang="en-US" dirty="0" smtClean="0"/>
+              <a:t>+O</a:t>
+            </a:r>
+            <a:r>
+              <a:rPr lang="en-US" baseline="-25000" dirty="0" smtClean="0"/>
+              <a:t>2</a:t>
+            </a:r>
+            <a:endParaRPr lang="en-US" baseline="-25000" dirty="0"/>
+          </a:p>
+        </p:txBody>
+      </p:sp>
+      <p:sp>
+        <p:nvSpPr>
+          <p:cNvPr id="12" name="Arc 11"/>
+          <p:cNvSpPr/>
+          <p:nvPr/>
+        </p:nvSpPr>
+        <p:spPr>
+          <a:xfrm>
+            <a:off x="3438150" y="2211558"/>
+            <a:ext cx="598446" cy="708660"/>
+          </a:xfrm>
+          <a:prstGeom prst="arc">
+            <a:avLst>
+              <a:gd name="adj1" fmla="val 16200000"/>
+              <a:gd name="adj2" fmla="val 719904"/>
+            </a:avLst>
+          </a:prstGeom>
+          <a:noFill/>
+          <a:ln w="38100">
+            <a:solidFill>
+              <a:schemeClr val="tx1"/>
+            </a:solidFill>
+            <a:headEnd type="triangle" w="med" len="med"/>
+            <a:tailEnd type="none" w="med" len="med"/>
+          </a:ln>
+        </p:spPr>
+        <p:style>
+          <a:lnRef idx="1">
+            <a:schemeClr val="accent1"/>
+          </a:lnRef>
+          <a:fillRef idx="0">
+            <a:schemeClr val="accent1"/>
+          </a:fillRef>
+          <a:effectRef idx="0">
+            <a:schemeClr val="accent1"/>
+          </a:effectRef>
+          <a:fontRef idx="minor">
+            <a:schemeClr val="tx1"/>
+          </a:fontRef>
+        </p:style>
+        <p:txBody>
+          <a:bodyPr rtlCol="0" anchor="ctr"/>
+          <a:lstStyle/>
+          <a:p>
+            <a:pPr algn="ctr"/>
+            <a:endParaRPr lang="en-US"/>
+          </a:p>
+        </p:txBody>
+      </p:sp>
+      <p:sp>
+        <p:nvSpPr>
+          <p:cNvPr id="28" name="TextBox 27"/>
+          <p:cNvSpPr txBox="1"/>
+          <p:nvPr/>
+        </p:nvSpPr>
+        <p:spPr>
+          <a:xfrm>
+            <a:off x="3112954" y="2006084"/>
+            <a:ext cx="683200" cy="369332"/>
+          </a:xfrm>
+          <a:prstGeom prst="rect">
+            <a:avLst/>
+          </a:prstGeom>
+          <a:noFill/>
+        </p:spPr>
+        <p:txBody>
+          <a:bodyPr wrap="none" rtlCol="0">
+            <a:spAutoFit/>
+          </a:bodyPr>
+          <a:lstStyle/>
+          <a:p>
+            <a:r>
+              <a:rPr lang="en-US" dirty="0" smtClean="0"/>
+              <a:t>CH</a:t>
+            </a:r>
+            <a:r>
+              <a:rPr lang="en-US" baseline="-25000" dirty="0" smtClean="0"/>
+              <a:t>2</a:t>
+            </a:r>
+            <a:r>
+              <a:rPr lang="en-US" dirty="0" smtClean="0"/>
+              <a:t>O</a:t>
+            </a:r>
+            <a:endParaRPr lang="en-US" baseline="-25000" dirty="0"/>
+          </a:p>
+        </p:txBody>
+      </p:sp>
+      <p:sp>
+        <p:nvSpPr>
+          <p:cNvPr id="30" name="TextBox 29"/>
+          <p:cNvSpPr txBox="1"/>
+          <p:nvPr/>
+        </p:nvSpPr>
+        <p:spPr>
+          <a:xfrm>
+            <a:off x="4276364" y="1250469"/>
+            <a:ext cx="530915" cy="369332"/>
+          </a:xfrm>
+          <a:prstGeom prst="rect">
+            <a:avLst/>
+          </a:prstGeom>
+          <a:noFill/>
+        </p:spPr>
+        <p:txBody>
+          <a:bodyPr wrap="none" rtlCol="0">
+            <a:spAutoFit/>
+          </a:bodyPr>
+          <a:lstStyle/>
+          <a:p>
+            <a:r>
+              <a:rPr lang="en-US" dirty="0" smtClean="0"/>
+              <a:t>+O</a:t>
+            </a:r>
+            <a:r>
+              <a:rPr lang="en-US" baseline="-25000" dirty="0" smtClean="0"/>
+              <a:t>2</a:t>
+            </a:r>
+            <a:endParaRPr lang="en-US" baseline="-25000" dirty="0"/>
+          </a:p>
+        </p:txBody>
+      </p:sp>
+      <p:sp>
+        <p:nvSpPr>
+          <p:cNvPr id="31" name="TextBox 30"/>
+          <p:cNvSpPr txBox="1"/>
+          <p:nvPr/>
+        </p:nvSpPr>
+        <p:spPr>
+          <a:xfrm>
+            <a:off x="4575492" y="837369"/>
+            <a:ext cx="1178079" cy="369332"/>
+          </a:xfrm>
+          <a:prstGeom prst="rect">
+            <a:avLst/>
+          </a:prstGeom>
+          <a:noFill/>
+        </p:spPr>
+        <p:txBody>
+          <a:bodyPr wrap="none" rtlCol="0">
+            <a:spAutoFit/>
+          </a:bodyPr>
+          <a:lstStyle/>
+          <a:p>
+            <a:r>
+              <a:rPr lang="en-US" dirty="0" smtClean="0"/>
+              <a:t>CO + CH</a:t>
+            </a:r>
+            <a:r>
+              <a:rPr lang="en-US" baseline="-25000" dirty="0" smtClean="0"/>
+              <a:t>2</a:t>
+            </a:r>
+            <a:r>
+              <a:rPr lang="en-US" dirty="0" smtClean="0"/>
+              <a:t>O</a:t>
+            </a:r>
+            <a:endParaRPr lang="en-US" baseline="-25000" dirty="0"/>
+          </a:p>
+        </p:txBody>
+      </p:sp>
+    </p:spTree>
+    <p:extLst>
+      <p:ext uri="{BB962C8B-B14F-4D97-AF65-F5344CB8AC3E}">
+        <p14:creationId xmlns:p14="http://schemas.microsoft.com/office/powerpoint/2010/main" val="460984842"/>
+      </p:ext>
+    </p:extLst>
+  </p:cSld>
+  <p:clrMapOvr>
+    <a:masterClrMapping/>
+  </p:clrMapOvr>
+  <p:timing>
+    <p:tnLst>
+      <p:par>
+        <p:cTn id="1" dur="indefinite" restart="never" nodeType="tmRoot"/>
+      </p:par>
+    </p:tnLst>
+  </p:timing>
+</p:sld>
+</file>
+
+<file path=ppt/slides/slide11.xml><?xml version="1.0" encoding="utf-8"?>
+<p:sld xmlns:a="http://schemas.openxmlformats.org/drawingml/2006/main" xmlns:r="http://schemas.openxmlformats.org/officeDocument/2006/relationships" xmlns:p="http://schemas.openxmlformats.org/presentationml/2006/main">
+  <p:cSld>
+    <p:spTree>
+      <p:nvGrpSpPr>
+        <p:cNvPr id="1" name=""/>
+        <p:cNvGrpSpPr/>
+        <p:nvPr/>
+      </p:nvGrpSpPr>
+      <p:grpSpPr>
+        <a:xfrm>
+          <a:off x="0" y="0"/>
+          <a:ext cx="0" cy="0"/>
+          <a:chOff x="0" y="0"/>
+          <a:chExt cx="0" cy="0"/>
+        </a:xfrm>
+      </p:grpSpPr>
+      <p:grpSp>
+        <p:nvGrpSpPr>
+          <p:cNvPr id="15" name="Group 14"/>
+          <p:cNvGrpSpPr/>
+          <p:nvPr/>
+        </p:nvGrpSpPr>
+        <p:grpSpPr>
+          <a:xfrm>
+            <a:off x="1765485" y="-2591062"/>
+            <a:ext cx="7165155" cy="8463441"/>
+            <a:chOff x="1765485" y="-2591062"/>
+            <a:chExt cx="7165155" cy="8463441"/>
+          </a:xfrm>
+        </p:grpSpPr>
+        <p:sp>
+          <p:nvSpPr>
+            <p:cNvPr id="13" name="Rectangle 12"/>
+            <p:cNvSpPr/>
+            <p:nvPr/>
+          </p:nvSpPr>
+          <p:spPr>
+            <a:xfrm>
+              <a:off x="2971800" y="727370"/>
+              <a:ext cx="5958840" cy="5145009"/>
+            </a:xfrm>
+            <a:prstGeom prst="rect">
+              <a:avLst/>
+            </a:prstGeom>
+            <a:solidFill>
+              <a:schemeClr val="bg1"/>
+            </a:solidFill>
+            <a:ln>
+              <a:solidFill>
+                <a:schemeClr val="bg1"/>
+              </a:solidFill>
+            </a:ln>
+          </p:spPr>
+          <p:style>
+            <a:lnRef idx="2">
+              <a:schemeClr val="accent1">
+                <a:shade val="50000"/>
+              </a:schemeClr>
+            </a:lnRef>
+            <a:fillRef idx="1">
+              <a:schemeClr val="accent1"/>
+            </a:fillRef>
+            <a:effectRef idx="0">
+              <a:schemeClr val="accent1"/>
+            </a:effectRef>
+            <a:fontRef idx="minor">
+              <a:schemeClr val="lt1"/>
+            </a:fontRef>
+          </p:style>
+          <p:txBody>
+            <a:bodyPr rtlCol="0" anchor="ctr"/>
+            <a:lstStyle/>
+            <a:p>
+              <a:pPr algn="ctr"/>
+              <a:endParaRPr lang="en-US"/>
+            </a:p>
+          </p:txBody>
+        </p:sp>
+        <p:sp>
+          <p:nvSpPr>
+            <p:cNvPr id="14" name="Arc 13"/>
+            <p:cNvSpPr/>
+            <p:nvPr/>
+          </p:nvSpPr>
+          <p:spPr>
+            <a:xfrm>
+              <a:off x="4230997" y="727370"/>
+              <a:ext cx="914400" cy="914400"/>
+            </a:xfrm>
+            <a:prstGeom prst="arc">
+              <a:avLst>
+                <a:gd name="adj1" fmla="val 21275520"/>
+                <a:gd name="adj2" fmla="val 3817827"/>
+              </a:avLst>
+            </a:prstGeom>
+            <a:noFill/>
+            <a:ln w="38100">
+              <a:solidFill>
+                <a:schemeClr val="tx1"/>
+              </a:solidFill>
+              <a:headEnd type="triangle" w="med" len="med"/>
+              <a:tailEnd type="none" w="med" len="med"/>
+            </a:ln>
+          </p:spPr>
+          <p:style>
+            <a:lnRef idx="1">
+              <a:schemeClr val="accent1"/>
+            </a:lnRef>
+            <a:fillRef idx="0">
+              <a:schemeClr val="accent1"/>
+            </a:fillRef>
+            <a:effectRef idx="0">
+              <a:schemeClr val="accent1"/>
+            </a:effectRef>
+            <a:fontRef idx="minor">
+              <a:schemeClr val="tx1"/>
+            </a:fontRef>
+          </p:style>
+          <p:txBody>
+            <a:bodyPr rtlCol="0" anchor="ctr"/>
+            <a:lstStyle/>
+            <a:p>
+              <a:pPr algn="ctr"/>
+              <a:endParaRPr lang="en-US"/>
+            </a:p>
+          </p:txBody>
+        </p:sp>
+        <p:grpSp>
+          <p:nvGrpSpPr>
+            <p:cNvPr id="10" name="Group 9"/>
+            <p:cNvGrpSpPr/>
+            <p:nvPr/>
+          </p:nvGrpSpPr>
+          <p:grpSpPr>
+            <a:xfrm>
+              <a:off x="1765485" y="-2591062"/>
+              <a:ext cx="6550455" cy="8303661"/>
+              <a:chOff x="1765485" y="-3154942"/>
+              <a:chExt cx="6550455" cy="8303661"/>
+            </a:xfrm>
+          </p:grpSpPr>
+          <p:grpSp>
+            <p:nvGrpSpPr>
+              <p:cNvPr id="3" name="Group 2"/>
+              <p:cNvGrpSpPr>
+                <a:grpSpLocks noChangeAspect="1"/>
+              </p:cNvGrpSpPr>
+              <p:nvPr/>
+            </p:nvGrpSpPr>
+            <p:grpSpPr>
+              <a:xfrm>
+                <a:off x="1765485" y="-3154942"/>
+                <a:ext cx="6409304" cy="8137528"/>
+                <a:chOff x="208933" y="-5534900"/>
+                <a:chExt cx="9593435" cy="12180235"/>
+              </a:xfrm>
+            </p:grpSpPr>
+            <p:sp>
+              <p:nvSpPr>
+                <p:cNvPr id="21" name="Arc 20"/>
+                <p:cNvSpPr>
+                  <a:spLocks noChangeAspect="1"/>
+                </p:cNvSpPr>
+                <p:nvPr/>
+              </p:nvSpPr>
+              <p:spPr>
+                <a:xfrm>
+                  <a:off x="3399759" y="241864"/>
+                  <a:ext cx="6400800" cy="6400800"/>
+                </a:xfrm>
+                <a:prstGeom prst="arc">
+                  <a:avLst>
+                    <a:gd name="adj1" fmla="val 16805050"/>
+                    <a:gd name="adj2" fmla="val 20103395"/>
+                  </a:avLst>
+                </a:prstGeom>
+                <a:noFill/>
+                <a:ln w="76200">
+                  <a:solidFill>
+                    <a:srgbClr val="FF0000"/>
+                  </a:solidFill>
+                  <a:headEnd type="none" w="med" len="med"/>
+                  <a:tailEnd type="triangle" w="med" len="med"/>
+                </a:ln>
+              </p:spPr>
+              <p:style>
+                <a:lnRef idx="1">
+                  <a:schemeClr val="accent1"/>
+                </a:lnRef>
+                <a:fillRef idx="0">
+                  <a:schemeClr val="accent1"/>
+                </a:fillRef>
+                <a:effectRef idx="0">
+                  <a:schemeClr val="accent1"/>
+                </a:effectRef>
+                <a:fontRef idx="minor">
+                  <a:schemeClr val="tx1"/>
+                </a:fontRef>
+              </p:style>
+              <p:txBody>
+                <a:bodyPr rtlCol="0" anchor="ctr"/>
+                <a:lstStyle/>
+                <a:p>
+                  <a:pPr algn="ctr"/>
+                  <a:endParaRPr lang="en-US"/>
+                </a:p>
+              </p:txBody>
+            </p:sp>
+            <p:sp>
+              <p:nvSpPr>
+                <p:cNvPr id="23" name="Arc 22"/>
+                <p:cNvSpPr>
+                  <a:spLocks noChangeAspect="1"/>
+                </p:cNvSpPr>
+                <p:nvPr/>
+              </p:nvSpPr>
+              <p:spPr>
+                <a:xfrm>
+                  <a:off x="3401568" y="244535"/>
+                  <a:ext cx="6400800" cy="6400800"/>
+                </a:xfrm>
+                <a:prstGeom prst="arc">
+                  <a:avLst>
+                    <a:gd name="adj1" fmla="val 20636489"/>
+                    <a:gd name="adj2" fmla="val 1261109"/>
+                  </a:avLst>
+                </a:prstGeom>
+                <a:noFill/>
+                <a:ln w="76200">
+                  <a:solidFill>
+                    <a:schemeClr val="tx1"/>
+                  </a:solidFill>
+                  <a:headEnd type="triangle" w="med" len="med"/>
+                  <a:tailEnd type="triangle" w="med" len="med"/>
+                </a:ln>
+              </p:spPr>
+              <p:style>
+                <a:lnRef idx="1">
+                  <a:schemeClr val="accent1"/>
+                </a:lnRef>
+                <a:fillRef idx="0">
+                  <a:schemeClr val="accent1"/>
+                </a:fillRef>
+                <a:effectRef idx="0">
+                  <a:schemeClr val="accent1"/>
+                </a:effectRef>
+                <a:fontRef idx="minor">
+                  <a:schemeClr val="tx1"/>
+                </a:fontRef>
+              </p:style>
+              <p:txBody>
+                <a:bodyPr rtlCol="0" anchor="ctr"/>
+                <a:lstStyle/>
+                <a:p>
+                  <a:pPr algn="ctr"/>
+                  <a:endParaRPr lang="en-US"/>
+                </a:p>
+              </p:txBody>
+            </p:sp>
+            <p:sp>
+              <p:nvSpPr>
+                <p:cNvPr id="24" name="Arc 23"/>
+                <p:cNvSpPr>
+                  <a:spLocks noChangeAspect="1"/>
+                </p:cNvSpPr>
+                <p:nvPr/>
+              </p:nvSpPr>
+              <p:spPr>
+                <a:xfrm>
+                  <a:off x="3401568" y="244535"/>
+                  <a:ext cx="6400800" cy="6400800"/>
+                </a:xfrm>
+                <a:prstGeom prst="arc">
+                  <a:avLst>
+                    <a:gd name="adj1" fmla="val 1983782"/>
+                    <a:gd name="adj2" fmla="val 4630424"/>
+                  </a:avLst>
+                </a:prstGeom>
+                <a:noFill/>
+                <a:ln w="76200">
+                  <a:solidFill>
+                    <a:schemeClr val="tx1"/>
+                  </a:solidFill>
+                  <a:headEnd type="triangle" w="med" len="med"/>
+                  <a:tailEnd type="triangle" w="med" len="med"/>
+                </a:ln>
+              </p:spPr>
+              <p:style>
+                <a:lnRef idx="1">
+                  <a:schemeClr val="accent1"/>
+                </a:lnRef>
+                <a:fillRef idx="0">
+                  <a:schemeClr val="accent1"/>
+                </a:fillRef>
+                <a:effectRef idx="0">
+                  <a:schemeClr val="accent1"/>
+                </a:effectRef>
+                <a:fontRef idx="minor">
+                  <a:schemeClr val="tx1"/>
+                </a:fontRef>
+              </p:style>
+              <p:txBody>
+                <a:bodyPr rtlCol="0" anchor="ctr"/>
+                <a:lstStyle/>
+                <a:p>
+                  <a:pPr algn="ctr"/>
+                  <a:endParaRPr lang="en-US"/>
+                </a:p>
+              </p:txBody>
+            </p:sp>
+            <p:sp>
+              <p:nvSpPr>
+                <p:cNvPr id="25" name="Arc 24"/>
+                <p:cNvSpPr>
+                  <a:spLocks noChangeAspect="1"/>
+                </p:cNvSpPr>
+                <p:nvPr/>
+              </p:nvSpPr>
+              <p:spPr>
+                <a:xfrm>
+                  <a:off x="3401568" y="244535"/>
+                  <a:ext cx="6400800" cy="6400800"/>
+                </a:xfrm>
+                <a:prstGeom prst="arc">
+                  <a:avLst>
+                    <a:gd name="adj1" fmla="val 6359187"/>
+                    <a:gd name="adj2" fmla="val 7532913"/>
+                  </a:avLst>
+                </a:prstGeom>
+                <a:noFill/>
+                <a:ln w="76200">
+                  <a:solidFill>
+                    <a:schemeClr val="tx1"/>
+                  </a:solidFill>
+                  <a:headEnd type="triangle" w="med" len="med"/>
+                  <a:tailEnd type="triangle" w="med" len="med"/>
+                </a:ln>
+              </p:spPr>
+              <p:style>
+                <a:lnRef idx="1">
+                  <a:schemeClr val="accent1"/>
+                </a:lnRef>
+                <a:fillRef idx="0">
+                  <a:schemeClr val="accent1"/>
+                </a:fillRef>
+                <a:effectRef idx="0">
+                  <a:schemeClr val="accent1"/>
+                </a:effectRef>
+                <a:fontRef idx="minor">
+                  <a:schemeClr val="tx1"/>
+                </a:fontRef>
+              </p:style>
+              <p:txBody>
+                <a:bodyPr rtlCol="0" anchor="ctr"/>
+                <a:lstStyle/>
+                <a:p>
+                  <a:pPr algn="ctr"/>
+                  <a:endParaRPr lang="en-US"/>
+                </a:p>
+              </p:txBody>
+            </p:sp>
+            <p:sp>
+              <p:nvSpPr>
+                <p:cNvPr id="34" name="Arc 33"/>
+                <p:cNvSpPr>
+                  <a:spLocks noChangeAspect="1"/>
+                </p:cNvSpPr>
+                <p:nvPr/>
+              </p:nvSpPr>
+              <p:spPr>
+                <a:xfrm>
+                  <a:off x="3401568" y="244535"/>
+                  <a:ext cx="6400800" cy="6400800"/>
+                </a:xfrm>
+                <a:prstGeom prst="arc">
+                  <a:avLst>
+                    <a:gd name="adj1" fmla="val 12010974"/>
+                    <a:gd name="adj2" fmla="val 12976064"/>
+                  </a:avLst>
+                </a:prstGeom>
+                <a:noFill/>
+                <a:ln w="76200">
+                  <a:solidFill>
+                    <a:schemeClr val="tx1"/>
+                  </a:solidFill>
+                  <a:headEnd type="none" w="med" len="med"/>
+                  <a:tailEnd type="triangle" w="med" len="med"/>
+                </a:ln>
+              </p:spPr>
+              <p:style>
+                <a:lnRef idx="1">
+                  <a:schemeClr val="accent1"/>
+                </a:lnRef>
+                <a:fillRef idx="0">
+                  <a:schemeClr val="accent1"/>
+                </a:fillRef>
+                <a:effectRef idx="0">
+                  <a:schemeClr val="accent1"/>
+                </a:effectRef>
+                <a:fontRef idx="minor">
+                  <a:schemeClr val="tx1"/>
+                </a:fontRef>
+              </p:style>
+              <p:txBody>
+                <a:bodyPr rtlCol="0" anchor="ctr"/>
+                <a:lstStyle/>
+                <a:p>
+                  <a:pPr algn="ctr"/>
+                  <a:endParaRPr lang="en-US"/>
+                </a:p>
+              </p:txBody>
+            </p:sp>
+            <p:sp>
+              <p:nvSpPr>
+                <p:cNvPr id="2" name="Arc 1"/>
+                <p:cNvSpPr>
+                  <a:spLocks noChangeAspect="1"/>
+                </p:cNvSpPr>
+                <p:nvPr/>
+              </p:nvSpPr>
+              <p:spPr>
+                <a:xfrm>
+                  <a:off x="1423428" y="-2010839"/>
+                  <a:ext cx="5487496" cy="7406640"/>
+                </a:xfrm>
+                <a:prstGeom prst="arc">
+                  <a:avLst>
+                    <a:gd name="adj1" fmla="val 20228158"/>
+                    <a:gd name="adj2" fmla="val 5480223"/>
+                  </a:avLst>
+                </a:prstGeom>
+                <a:noFill/>
+                <a:ln w="76200">
+                  <a:solidFill>
+                    <a:schemeClr val="accent1"/>
+                  </a:solidFill>
+                  <a:headEnd type="triangle" w="med" len="med"/>
+                  <a:tailEnd type="none" w="med" len="med"/>
+                </a:ln>
+              </p:spPr>
+              <p:style>
+                <a:lnRef idx="1">
+                  <a:schemeClr val="accent1"/>
+                </a:lnRef>
+                <a:fillRef idx="0">
+                  <a:schemeClr val="accent1"/>
+                </a:fillRef>
+                <a:effectRef idx="0">
+                  <a:schemeClr val="accent1"/>
+                </a:effectRef>
+                <a:fontRef idx="minor">
+                  <a:schemeClr val="tx1"/>
+                </a:fontRef>
+              </p:style>
+              <p:txBody>
+                <a:bodyPr rtlCol="0" anchor="ctr"/>
+                <a:lstStyle/>
+                <a:p>
+                  <a:pPr algn="ctr"/>
+                  <a:endParaRPr lang="en-US"/>
+                </a:p>
+              </p:txBody>
+            </p:sp>
+            <p:sp>
+              <p:nvSpPr>
+                <p:cNvPr id="20" name="Arc 19"/>
+                <p:cNvSpPr>
+                  <a:spLocks noChangeAspect="1"/>
+                </p:cNvSpPr>
+                <p:nvPr/>
+              </p:nvSpPr>
+              <p:spPr>
+                <a:xfrm>
+                  <a:off x="208933" y="-5534900"/>
+                  <a:ext cx="6390494" cy="9144000"/>
+                </a:xfrm>
+                <a:prstGeom prst="arc">
+                  <a:avLst>
+                    <a:gd name="adj1" fmla="val 1630765"/>
+                    <a:gd name="adj2" fmla="val 5406928"/>
+                  </a:avLst>
+                </a:prstGeom>
+                <a:noFill/>
+                <a:ln w="76200">
+                  <a:solidFill>
+                    <a:schemeClr val="accent1"/>
+                  </a:solidFill>
+                  <a:headEnd type="triangle" w="med" len="med"/>
+                  <a:tailEnd type="none" w="med" len="med"/>
+                </a:ln>
+              </p:spPr>
+              <p:style>
+                <a:lnRef idx="1">
+                  <a:schemeClr val="accent1"/>
+                </a:lnRef>
+                <a:fillRef idx="0">
+                  <a:schemeClr val="accent1"/>
+                </a:fillRef>
+                <a:effectRef idx="0">
+                  <a:schemeClr val="accent1"/>
+                </a:effectRef>
+                <a:fontRef idx="minor">
+                  <a:schemeClr val="tx1"/>
+                </a:fontRef>
+              </p:style>
+              <p:txBody>
+                <a:bodyPr rtlCol="0" anchor="ctr"/>
+                <a:lstStyle/>
+                <a:p>
+                  <a:pPr algn="ctr"/>
+                  <a:endParaRPr lang="en-US"/>
+                </a:p>
+              </p:txBody>
+            </p:sp>
+            <p:sp>
+              <p:nvSpPr>
+                <p:cNvPr id="32" name="Arc 31"/>
+                <p:cNvSpPr>
+                  <a:spLocks noChangeAspect="1"/>
+                </p:cNvSpPr>
+                <p:nvPr/>
+              </p:nvSpPr>
+              <p:spPr>
+                <a:xfrm>
+                  <a:off x="3401568" y="244535"/>
+                  <a:ext cx="6400800" cy="6400800"/>
+                </a:xfrm>
+                <a:prstGeom prst="arc">
+                  <a:avLst>
+                    <a:gd name="adj1" fmla="val 10542843"/>
+                    <a:gd name="adj2" fmla="val 11340972"/>
+                  </a:avLst>
+                </a:prstGeom>
+                <a:noFill/>
+                <a:ln w="76200">
+                  <a:solidFill>
+                    <a:schemeClr val="tx1"/>
+                  </a:solidFill>
+                  <a:headEnd type="none" w="med" len="med"/>
+                  <a:tailEnd type="triangle" w="med" len="med"/>
+                </a:ln>
+              </p:spPr>
+              <p:style>
+                <a:lnRef idx="1">
+                  <a:schemeClr val="accent1"/>
+                </a:lnRef>
+                <a:fillRef idx="0">
+                  <a:schemeClr val="accent1"/>
+                </a:fillRef>
+                <a:effectRef idx="0">
+                  <a:schemeClr val="accent1"/>
+                </a:effectRef>
+                <a:fontRef idx="minor">
+                  <a:schemeClr val="tx1"/>
+                </a:fontRef>
+              </p:style>
+              <p:txBody>
+                <a:bodyPr rtlCol="0" anchor="ctr"/>
+                <a:lstStyle/>
+                <a:p>
+                  <a:pPr algn="ctr"/>
+                  <a:endParaRPr lang="en-US"/>
+                </a:p>
+              </p:txBody>
+            </p:sp>
+            <p:sp>
+              <p:nvSpPr>
+                <p:cNvPr id="29" name="Arc 28"/>
+                <p:cNvSpPr>
+                  <a:spLocks noChangeAspect="1"/>
+                </p:cNvSpPr>
+                <p:nvPr/>
+              </p:nvSpPr>
+              <p:spPr>
+                <a:xfrm>
+                  <a:off x="3401568" y="244535"/>
+                  <a:ext cx="6400800" cy="6400800"/>
+                </a:xfrm>
+                <a:prstGeom prst="arc">
+                  <a:avLst>
+                    <a:gd name="adj1" fmla="val 8456322"/>
+                    <a:gd name="adj2" fmla="val 9844837"/>
+                  </a:avLst>
+                </a:prstGeom>
+                <a:noFill/>
+                <a:ln w="76200">
+                  <a:solidFill>
+                    <a:schemeClr val="tx1"/>
+                  </a:solidFill>
+                  <a:headEnd type="none" w="med" len="med"/>
+                  <a:tailEnd type="triangle" w="med" len="med"/>
+                </a:ln>
+              </p:spPr>
+              <p:style>
+                <a:lnRef idx="1">
+                  <a:schemeClr val="accent1"/>
+                </a:lnRef>
+                <a:fillRef idx="0">
+                  <a:schemeClr val="accent1"/>
+                </a:fillRef>
+                <a:effectRef idx="0">
+                  <a:schemeClr val="accent1"/>
+                </a:effectRef>
+                <a:fontRef idx="minor">
+                  <a:schemeClr val="tx1"/>
+                </a:fontRef>
+              </p:style>
+              <p:txBody>
+                <a:bodyPr rtlCol="0" anchor="ctr"/>
+                <a:lstStyle/>
+                <a:p>
+                  <a:pPr algn="ctr"/>
+                  <a:endParaRPr lang="en-US"/>
+                </a:p>
+              </p:txBody>
+            </p:sp>
+            <p:sp>
+              <p:nvSpPr>
+                <p:cNvPr id="37" name="Arc 36"/>
+                <p:cNvSpPr>
+                  <a:spLocks noChangeAspect="1"/>
+                </p:cNvSpPr>
+                <p:nvPr/>
+              </p:nvSpPr>
+              <p:spPr>
+                <a:xfrm>
+                  <a:off x="3401568" y="244535"/>
+                  <a:ext cx="6400800" cy="6400800"/>
+                </a:xfrm>
+                <a:prstGeom prst="arc">
+                  <a:avLst>
+                    <a:gd name="adj1" fmla="val 13952431"/>
+                    <a:gd name="adj2" fmla="val 15720091"/>
+                  </a:avLst>
+                </a:prstGeom>
+                <a:noFill/>
+                <a:ln w="76200">
+                  <a:solidFill>
+                    <a:schemeClr val="accent1"/>
+                  </a:solidFill>
+                  <a:headEnd type="none" w="med" len="med"/>
+                  <a:tailEnd type="triangle" w="med" len="med"/>
+                </a:ln>
+              </p:spPr>
+              <p:style>
+                <a:lnRef idx="1">
+                  <a:schemeClr val="accent1"/>
+                </a:lnRef>
+                <a:fillRef idx="0">
+                  <a:schemeClr val="accent1"/>
+                </a:fillRef>
+                <a:effectRef idx="0">
+                  <a:schemeClr val="accent1"/>
+                </a:effectRef>
+                <a:fontRef idx="minor">
+                  <a:schemeClr val="tx1"/>
+                </a:fontRef>
+              </p:style>
+              <p:txBody>
+                <a:bodyPr rtlCol="0" anchor="ctr"/>
+                <a:lstStyle/>
+                <a:p>
+                  <a:pPr algn="ctr"/>
+                  <a:endParaRPr lang="en-US"/>
+                </a:p>
+              </p:txBody>
+            </p:sp>
+          </p:grpSp>
+          <p:sp>
+            <p:nvSpPr>
+              <p:cNvPr id="4" name="TextBox 3"/>
+              <p:cNvSpPr txBox="1"/>
+              <p:nvPr/>
+            </p:nvSpPr>
+            <p:spPr>
+              <a:xfrm>
+                <a:off x="5801504" y="544490"/>
+                <a:ext cx="486030" cy="369332"/>
+              </a:xfrm>
+              <a:prstGeom prst="rect">
+                <a:avLst/>
+              </a:prstGeom>
+              <a:noFill/>
+            </p:spPr>
+            <p:txBody>
+              <a:bodyPr wrap="none" rtlCol="0">
+                <a:spAutoFit/>
+              </a:bodyPr>
+              <a:lstStyle/>
+              <a:p>
+                <a:r>
+                  <a:rPr lang="en-US" b="1" dirty="0" smtClean="0"/>
+                  <a:t>OH</a:t>
+                </a:r>
+                <a:endParaRPr lang="en-US" b="1" dirty="0"/>
+              </a:p>
+            </p:txBody>
+          </p:sp>
+          <p:sp>
+            <p:nvSpPr>
+              <p:cNvPr id="22" name="TextBox 21"/>
+              <p:cNvSpPr txBox="1"/>
+              <p:nvPr/>
+            </p:nvSpPr>
+            <p:spPr>
+              <a:xfrm>
+                <a:off x="7874602" y="1913515"/>
+                <a:ext cx="437940" cy="369332"/>
+              </a:xfrm>
+              <a:prstGeom prst="rect">
+                <a:avLst/>
+              </a:prstGeom>
+              <a:noFill/>
+            </p:spPr>
+            <p:txBody>
+              <a:bodyPr wrap="none" rtlCol="0">
+                <a:spAutoFit/>
+              </a:bodyPr>
+              <a:lstStyle/>
+              <a:p>
+                <a:r>
+                  <a:rPr lang="en-US" b="1" dirty="0" err="1" smtClean="0"/>
+                  <a:t>nR</a:t>
+                </a:r>
+                <a:endParaRPr lang="en-US" b="1" dirty="0"/>
+              </a:p>
+            </p:txBody>
+          </p:sp>
+          <p:sp>
+            <p:nvSpPr>
+              <p:cNvPr id="26" name="TextBox 25"/>
+              <p:cNvSpPr txBox="1"/>
+              <p:nvPr/>
+            </p:nvSpPr>
+            <p:spPr>
+              <a:xfrm>
+                <a:off x="7646205" y="3635123"/>
+                <a:ext cx="669735" cy="369332"/>
+              </a:xfrm>
+              <a:prstGeom prst="rect">
+                <a:avLst/>
+              </a:prstGeom>
+              <a:noFill/>
+            </p:spPr>
+            <p:txBody>
+              <a:bodyPr wrap="none" rtlCol="0">
+                <a:spAutoFit/>
+              </a:bodyPr>
+              <a:lstStyle/>
+              <a:p>
+                <a:r>
+                  <a:rPr lang="en-US" b="1" dirty="0" smtClean="0"/>
+                  <a:t>nRO</a:t>
+                </a:r>
+                <a:r>
+                  <a:rPr lang="en-US" b="1" baseline="-25000" dirty="0" smtClean="0"/>
+                  <a:t>2</a:t>
+                </a:r>
+                <a:endParaRPr lang="en-US" b="1" baseline="-25000" dirty="0"/>
+              </a:p>
+            </p:txBody>
+          </p:sp>
+          <p:sp>
+            <p:nvSpPr>
+              <p:cNvPr id="5" name="TextBox 4"/>
+              <p:cNvSpPr txBox="1"/>
+              <p:nvPr/>
+            </p:nvSpPr>
+            <p:spPr>
+              <a:xfrm>
+                <a:off x="5550346" y="4779387"/>
+                <a:ext cx="867545" cy="369332"/>
+              </a:xfrm>
+              <a:prstGeom prst="rect">
+                <a:avLst/>
+              </a:prstGeom>
+              <a:noFill/>
+            </p:spPr>
+            <p:txBody>
+              <a:bodyPr wrap="none" rtlCol="0">
+                <a:spAutoFit/>
+              </a:bodyPr>
+              <a:lstStyle/>
+              <a:p>
+                <a:r>
+                  <a:rPr lang="en-US" dirty="0" smtClean="0">
+                    <a:ln>
+                      <a:solidFill>
+                        <a:schemeClr val="tx1"/>
+                      </a:solidFill>
+                    </a:ln>
+                  </a:rPr>
+                  <a:t>QOOH</a:t>
+                </a:r>
+                <a:r>
+                  <a:rPr lang="en-US" baseline="-25000" dirty="0" smtClean="0">
+                    <a:ln>
+                      <a:solidFill>
+                        <a:schemeClr val="tx1"/>
+                      </a:solidFill>
+                    </a:ln>
+                  </a:rPr>
+                  <a:t>1</a:t>
+                </a:r>
+                <a:endParaRPr lang="en-US" baseline="-25000" dirty="0">
+                  <a:ln>
+                    <a:solidFill>
+                      <a:schemeClr val="tx1"/>
+                    </a:solidFill>
+                  </a:ln>
+                </a:endParaRPr>
+              </a:p>
+            </p:txBody>
+          </p:sp>
+          <p:sp>
+            <p:nvSpPr>
+              <p:cNvPr id="6" name="TextBox 5"/>
+              <p:cNvSpPr txBox="1"/>
+              <p:nvPr/>
+            </p:nvSpPr>
+            <p:spPr>
+              <a:xfrm>
+                <a:off x="3992633" y="4176073"/>
+                <a:ext cx="1098378" cy="369332"/>
+              </a:xfrm>
+              <a:prstGeom prst="rect">
+                <a:avLst/>
+              </a:prstGeom>
+              <a:noFill/>
+            </p:spPr>
+            <p:txBody>
+              <a:bodyPr wrap="none" rtlCol="0">
+                <a:spAutoFit/>
+              </a:bodyPr>
+              <a:lstStyle/>
+              <a:p>
+                <a:r>
+                  <a:rPr lang="en-US" dirty="0" smtClean="0">
+                    <a:ln>
+                      <a:solidFill>
+                        <a:schemeClr val="tx1"/>
+                      </a:solidFill>
+                    </a:ln>
+                  </a:rPr>
+                  <a:t>O</a:t>
+                </a:r>
+                <a:r>
+                  <a:rPr lang="en-US" baseline="-25000" dirty="0" smtClean="0">
+                    <a:ln>
+                      <a:solidFill>
+                        <a:schemeClr val="tx1"/>
+                      </a:solidFill>
+                    </a:ln>
+                  </a:rPr>
+                  <a:t>2</a:t>
+                </a:r>
+                <a:r>
+                  <a:rPr lang="en-US" dirty="0" smtClean="0">
+                    <a:ln>
+                      <a:solidFill>
+                        <a:schemeClr val="tx1"/>
+                      </a:solidFill>
+                    </a:ln>
+                  </a:rPr>
+                  <a:t>QOOH</a:t>
+                </a:r>
+                <a:r>
+                  <a:rPr lang="en-US" baseline="-25000" dirty="0" smtClean="0">
+                    <a:ln>
+                      <a:solidFill>
+                        <a:schemeClr val="tx1"/>
+                      </a:solidFill>
+                    </a:ln>
+                  </a:rPr>
+                  <a:t>1</a:t>
+                </a:r>
+                <a:endParaRPr lang="en-US" baseline="-25000" dirty="0">
+                  <a:ln>
+                    <a:solidFill>
+                      <a:schemeClr val="tx1"/>
+                    </a:solidFill>
+                  </a:ln>
+                </a:endParaRPr>
+              </a:p>
+            </p:txBody>
+          </p:sp>
+          <p:sp>
+            <p:nvSpPr>
+              <p:cNvPr id="7" name="TextBox 6"/>
+              <p:cNvSpPr txBox="1"/>
+              <p:nvPr/>
+            </p:nvSpPr>
+            <p:spPr>
+              <a:xfrm>
+                <a:off x="3394187" y="3063712"/>
+                <a:ext cx="1069780" cy="369332"/>
+              </a:xfrm>
+              <a:prstGeom prst="rect">
+                <a:avLst/>
+              </a:prstGeom>
+              <a:noFill/>
+            </p:spPr>
+            <p:txBody>
+              <a:bodyPr wrap="none" rtlCol="0">
+                <a:spAutoFit/>
+              </a:bodyPr>
+              <a:lstStyle/>
+              <a:p>
+                <a:r>
+                  <a:rPr lang="en-US" dirty="0" smtClean="0">
+                    <a:ln>
+                      <a:solidFill>
+                        <a:schemeClr val="tx1"/>
+                      </a:solidFill>
+                    </a:ln>
+                  </a:rPr>
+                  <a:t>OQ’OOH</a:t>
+                </a:r>
+                <a:r>
+                  <a:rPr lang="en-US" baseline="-25000" dirty="0" smtClean="0">
+                    <a:ln>
+                      <a:solidFill>
+                        <a:schemeClr val="tx1"/>
+                      </a:solidFill>
+                    </a:ln>
+                  </a:rPr>
+                  <a:t>1</a:t>
+                </a:r>
+                <a:endParaRPr lang="en-US" baseline="-25000" dirty="0">
+                  <a:ln>
+                    <a:solidFill>
+                      <a:schemeClr val="tx1"/>
+                    </a:solidFill>
+                  </a:ln>
+                </a:endParaRPr>
+              </a:p>
+            </p:txBody>
+          </p:sp>
+          <p:sp>
+            <p:nvSpPr>
+              <p:cNvPr id="8" name="TextBox 7"/>
+              <p:cNvSpPr txBox="1"/>
+              <p:nvPr/>
+            </p:nvSpPr>
+            <p:spPr>
+              <a:xfrm>
+                <a:off x="3570747" y="2126461"/>
+                <a:ext cx="773225" cy="369332"/>
+              </a:xfrm>
+              <a:prstGeom prst="rect">
+                <a:avLst/>
+              </a:prstGeom>
+              <a:noFill/>
+            </p:spPr>
+            <p:txBody>
+              <a:bodyPr wrap="none" rtlCol="0">
+                <a:spAutoFit/>
+              </a:bodyPr>
+              <a:lstStyle/>
+              <a:p>
+                <a:r>
+                  <a:rPr lang="en-US" dirty="0" smtClean="0">
+                    <a:ln>
+                      <a:solidFill>
+                        <a:schemeClr val="tx1"/>
+                      </a:solidFill>
+                    </a:ln>
+                  </a:rPr>
+                  <a:t>OQ’O</a:t>
+                </a:r>
+                <a:r>
+                  <a:rPr lang="en-US" baseline="-25000" dirty="0" smtClean="0">
+                    <a:ln>
+                      <a:solidFill>
+                        <a:schemeClr val="tx1"/>
+                      </a:solidFill>
+                    </a:ln>
+                  </a:rPr>
+                  <a:t>1</a:t>
+                </a:r>
+                <a:endParaRPr lang="en-US" baseline="-25000" dirty="0">
+                  <a:ln>
+                    <a:solidFill>
+                      <a:schemeClr val="tx1"/>
+                    </a:solidFill>
+                  </a:ln>
+                </a:endParaRPr>
+              </a:p>
+            </p:txBody>
+          </p:sp>
+          <p:sp>
+            <p:nvSpPr>
+              <p:cNvPr id="9" name="TextBox 8"/>
+              <p:cNvSpPr txBox="1"/>
+              <p:nvPr/>
+            </p:nvSpPr>
+            <p:spPr>
+              <a:xfrm>
+                <a:off x="4019236" y="1159496"/>
+                <a:ext cx="950901" cy="369332"/>
+              </a:xfrm>
+              <a:prstGeom prst="rect">
+                <a:avLst/>
+              </a:prstGeom>
+              <a:noFill/>
+            </p:spPr>
+            <p:txBody>
+              <a:bodyPr wrap="none" rtlCol="0">
+                <a:spAutoFit/>
+              </a:bodyPr>
+              <a:lstStyle/>
+              <a:p>
+                <a:r>
+                  <a:rPr lang="en-US" dirty="0" smtClean="0">
+                    <a:ln>
+                      <a:solidFill>
+                        <a:schemeClr val="tx1"/>
+                      </a:solidFill>
+                    </a:ln>
+                  </a:rPr>
+                  <a:t>CH</a:t>
+                </a:r>
+                <a:r>
+                  <a:rPr lang="en-US" baseline="-25000" dirty="0" smtClean="0">
+                    <a:ln>
+                      <a:solidFill>
+                        <a:schemeClr val="tx1"/>
+                      </a:solidFill>
+                    </a:ln>
+                  </a:rPr>
+                  <a:t>2</a:t>
+                </a:r>
+                <a:r>
+                  <a:rPr lang="en-US" dirty="0" smtClean="0">
+                    <a:ln>
+                      <a:solidFill>
+                        <a:schemeClr val="tx1"/>
+                      </a:solidFill>
+                    </a:ln>
+                  </a:rPr>
+                  <a:t>CHO</a:t>
+                </a:r>
+                <a:endParaRPr lang="en-US" baseline="-25000" dirty="0">
+                  <a:ln>
+                    <a:solidFill>
+                      <a:schemeClr val="tx1"/>
+                    </a:solidFill>
+                  </a:ln>
+                </a:endParaRPr>
+              </a:p>
+            </p:txBody>
+          </p:sp>
+        </p:grpSp>
+        <p:sp>
+          <p:nvSpPr>
+            <p:cNvPr id="11" name="TextBox 10"/>
+            <p:cNvSpPr txBox="1"/>
+            <p:nvPr/>
+          </p:nvSpPr>
+          <p:spPr>
+            <a:xfrm>
+              <a:off x="8268582" y="3298289"/>
+              <a:ext cx="530915" cy="369332"/>
+            </a:xfrm>
+            <a:prstGeom prst="rect">
+              <a:avLst/>
+            </a:prstGeom>
+            <a:noFill/>
+          </p:spPr>
+          <p:txBody>
+            <a:bodyPr wrap="none" rtlCol="0">
+              <a:spAutoFit/>
+            </a:bodyPr>
+            <a:lstStyle/>
+            <a:p>
+              <a:r>
+                <a:rPr lang="en-US" dirty="0" smtClean="0"/>
+                <a:t>+O</a:t>
+              </a:r>
+              <a:r>
+                <a:rPr lang="en-US" baseline="-25000" dirty="0" smtClean="0"/>
+                <a:t>2</a:t>
+              </a:r>
+              <a:endParaRPr lang="en-US" baseline="-25000" dirty="0"/>
+            </a:p>
+          </p:txBody>
+        </p:sp>
+        <p:sp>
+          <p:nvSpPr>
+            <p:cNvPr id="27" name="TextBox 26"/>
+            <p:cNvSpPr txBox="1"/>
+            <p:nvPr/>
+          </p:nvSpPr>
+          <p:spPr>
+            <a:xfrm>
+              <a:off x="4642286" y="5346369"/>
+              <a:ext cx="530915" cy="369332"/>
+            </a:xfrm>
+            <a:prstGeom prst="rect">
+              <a:avLst/>
+            </a:prstGeom>
+            <a:noFill/>
+          </p:spPr>
+          <p:txBody>
+            <a:bodyPr wrap="none" rtlCol="0">
+              <a:spAutoFit/>
+            </a:bodyPr>
+            <a:lstStyle/>
+            <a:p>
+              <a:r>
+                <a:rPr lang="en-US" dirty="0" smtClean="0"/>
+                <a:t>+O</a:t>
+              </a:r>
+              <a:r>
+                <a:rPr lang="en-US" baseline="-25000" dirty="0" smtClean="0"/>
+                <a:t>2</a:t>
+              </a:r>
+              <a:endParaRPr lang="en-US" baseline="-25000" dirty="0"/>
+            </a:p>
+          </p:txBody>
+        </p:sp>
+        <p:sp>
+          <p:nvSpPr>
+            <p:cNvPr id="12" name="Arc 11"/>
+            <p:cNvSpPr/>
+            <p:nvPr/>
+          </p:nvSpPr>
+          <p:spPr>
+            <a:xfrm>
+              <a:off x="3438150" y="2211558"/>
+              <a:ext cx="598446" cy="708660"/>
+            </a:xfrm>
+            <a:prstGeom prst="arc">
+              <a:avLst>
+                <a:gd name="adj1" fmla="val 16200000"/>
+                <a:gd name="adj2" fmla="val 719904"/>
+              </a:avLst>
+            </a:prstGeom>
+            <a:noFill/>
+            <a:ln w="38100">
+              <a:solidFill>
+                <a:schemeClr val="tx1"/>
+              </a:solidFill>
+              <a:headEnd type="triangle" w="med" len="med"/>
+              <a:tailEnd type="none" w="med" len="med"/>
+            </a:ln>
+          </p:spPr>
+          <p:style>
+            <a:lnRef idx="1">
+              <a:schemeClr val="accent1"/>
+            </a:lnRef>
+            <a:fillRef idx="0">
+              <a:schemeClr val="accent1"/>
+            </a:fillRef>
+            <a:effectRef idx="0">
+              <a:schemeClr val="accent1"/>
+            </a:effectRef>
+            <a:fontRef idx="minor">
+              <a:schemeClr val="tx1"/>
+            </a:fontRef>
+          </p:style>
+          <p:txBody>
+            <a:bodyPr rtlCol="0" anchor="ctr"/>
+            <a:lstStyle/>
+            <a:p>
+              <a:pPr algn="ctr"/>
+              <a:endParaRPr lang="en-US"/>
+            </a:p>
+          </p:txBody>
+        </p:sp>
+        <p:sp>
+          <p:nvSpPr>
+            <p:cNvPr id="28" name="TextBox 27"/>
+            <p:cNvSpPr txBox="1"/>
+            <p:nvPr/>
+          </p:nvSpPr>
+          <p:spPr>
+            <a:xfrm>
+              <a:off x="3112954" y="2006084"/>
+              <a:ext cx="683200" cy="369332"/>
+            </a:xfrm>
+            <a:prstGeom prst="rect">
+              <a:avLst/>
+            </a:prstGeom>
+            <a:noFill/>
+          </p:spPr>
+          <p:txBody>
+            <a:bodyPr wrap="none" rtlCol="0">
+              <a:spAutoFit/>
+            </a:bodyPr>
+            <a:lstStyle/>
+            <a:p>
+              <a:r>
+                <a:rPr lang="en-US" dirty="0" smtClean="0"/>
+                <a:t>CH</a:t>
+              </a:r>
+              <a:r>
+                <a:rPr lang="en-US" baseline="-25000" dirty="0" smtClean="0"/>
+                <a:t>2</a:t>
+              </a:r>
+              <a:r>
+                <a:rPr lang="en-US" dirty="0" smtClean="0"/>
+                <a:t>O</a:t>
+              </a:r>
+              <a:endParaRPr lang="en-US" baseline="-25000" dirty="0"/>
+            </a:p>
+          </p:txBody>
+        </p:sp>
+        <p:sp>
+          <p:nvSpPr>
+            <p:cNvPr id="30" name="TextBox 29"/>
+            <p:cNvSpPr txBox="1"/>
+            <p:nvPr/>
+          </p:nvSpPr>
+          <p:spPr>
+            <a:xfrm>
+              <a:off x="4276364" y="1250469"/>
+              <a:ext cx="530915" cy="369332"/>
+            </a:xfrm>
+            <a:prstGeom prst="rect">
+              <a:avLst/>
+            </a:prstGeom>
+            <a:noFill/>
+          </p:spPr>
+          <p:txBody>
+            <a:bodyPr wrap="none" rtlCol="0">
+              <a:spAutoFit/>
+            </a:bodyPr>
+            <a:lstStyle/>
+            <a:p>
+              <a:r>
+                <a:rPr lang="en-US" dirty="0" smtClean="0"/>
+                <a:t>+O</a:t>
+              </a:r>
+              <a:r>
+                <a:rPr lang="en-US" baseline="-25000" dirty="0" smtClean="0"/>
+                <a:t>2</a:t>
+              </a:r>
+              <a:endParaRPr lang="en-US" baseline="-25000" dirty="0"/>
+            </a:p>
+          </p:txBody>
+        </p:sp>
+        <p:sp>
+          <p:nvSpPr>
+            <p:cNvPr id="31" name="TextBox 30"/>
+            <p:cNvSpPr txBox="1"/>
+            <p:nvPr/>
+          </p:nvSpPr>
+          <p:spPr>
+            <a:xfrm>
+              <a:off x="4575492" y="837369"/>
+              <a:ext cx="1178079" cy="369332"/>
+            </a:xfrm>
+            <a:prstGeom prst="rect">
+              <a:avLst/>
+            </a:prstGeom>
+            <a:noFill/>
+          </p:spPr>
+          <p:txBody>
+            <a:bodyPr wrap="none" rtlCol="0">
+              <a:spAutoFit/>
+            </a:bodyPr>
+            <a:lstStyle/>
+            <a:p>
+              <a:r>
+                <a:rPr lang="en-US" dirty="0" smtClean="0"/>
+                <a:t>CO + CH</a:t>
+              </a:r>
+              <a:r>
+                <a:rPr lang="en-US" baseline="-25000" dirty="0" smtClean="0"/>
+                <a:t>2</a:t>
+              </a:r>
+              <a:r>
+                <a:rPr lang="en-US" dirty="0" smtClean="0"/>
+                <a:t>O</a:t>
+              </a:r>
+              <a:endParaRPr lang="en-US" baseline="-25000" dirty="0"/>
+            </a:p>
+          </p:txBody>
+        </p:sp>
+      </p:grpSp>
+    </p:spTree>
+    <p:extLst>
+      <p:ext uri="{BB962C8B-B14F-4D97-AF65-F5344CB8AC3E}">
+        <p14:creationId xmlns:p14="http://schemas.microsoft.com/office/powerpoint/2010/main" val="3389613989"/>
       </p:ext>
     </p:extLst>
   </p:cSld>

</xml_diff>